<commit_message>
update slide and asta
</commit_message>
<xml_diff>
--- a/Final Project/Design/Slide.pptx
+++ b/Final Project/Design/Slide.pptx
@@ -3331,7 +3331,7 @@
           <a:p>
             <a:fld id="{EB74E135-061F-4684-BC58-EA3602960468}" type="datetimeFigureOut">
               <a:rPr lang="en-US" smtClean="0"/>
-              <a:t>1/3/2022</a:t>
+              <a:t>1/4/2022</a:t>
             </a:fld>
             <a:endParaRPr lang="en-US"/>
           </a:p>
@@ -3529,7 +3529,7 @@
           <a:p>
             <a:fld id="{EB74E135-061F-4684-BC58-EA3602960468}" type="datetimeFigureOut">
               <a:rPr lang="en-US" smtClean="0"/>
-              <a:t>1/3/2022</a:t>
+              <a:t>1/4/2022</a:t>
             </a:fld>
             <a:endParaRPr lang="en-US"/>
           </a:p>
@@ -3737,7 +3737,7 @@
           <a:p>
             <a:fld id="{EB74E135-061F-4684-BC58-EA3602960468}" type="datetimeFigureOut">
               <a:rPr lang="en-US" smtClean="0"/>
-              <a:t>1/3/2022</a:t>
+              <a:t>1/4/2022</a:t>
             </a:fld>
             <a:endParaRPr lang="en-US"/>
           </a:p>
@@ -3935,7 +3935,7 @@
           <a:p>
             <a:fld id="{EB74E135-061F-4684-BC58-EA3602960468}" type="datetimeFigureOut">
               <a:rPr lang="en-US" smtClean="0"/>
-              <a:t>1/3/2022</a:t>
+              <a:t>1/4/2022</a:t>
             </a:fld>
             <a:endParaRPr lang="en-US"/>
           </a:p>
@@ -4210,7 +4210,7 @@
           <a:p>
             <a:fld id="{EB74E135-061F-4684-BC58-EA3602960468}" type="datetimeFigureOut">
               <a:rPr lang="en-US" smtClean="0"/>
-              <a:t>1/3/2022</a:t>
+              <a:t>1/4/2022</a:t>
             </a:fld>
             <a:endParaRPr lang="en-US"/>
           </a:p>
@@ -4475,7 +4475,7 @@
           <a:p>
             <a:fld id="{EB74E135-061F-4684-BC58-EA3602960468}" type="datetimeFigureOut">
               <a:rPr lang="en-US" smtClean="0"/>
-              <a:t>1/3/2022</a:t>
+              <a:t>1/4/2022</a:t>
             </a:fld>
             <a:endParaRPr lang="en-US"/>
           </a:p>
@@ -4887,7 +4887,7 @@
           <a:p>
             <a:fld id="{EB74E135-061F-4684-BC58-EA3602960468}" type="datetimeFigureOut">
               <a:rPr lang="en-US" smtClean="0"/>
-              <a:t>1/3/2022</a:t>
+              <a:t>1/4/2022</a:t>
             </a:fld>
             <a:endParaRPr lang="en-US"/>
           </a:p>
@@ -5028,7 +5028,7 @@
           <a:p>
             <a:fld id="{EB74E135-061F-4684-BC58-EA3602960468}" type="datetimeFigureOut">
               <a:rPr lang="en-US" smtClean="0"/>
-              <a:t>1/3/2022</a:t>
+              <a:t>1/4/2022</a:t>
             </a:fld>
             <a:endParaRPr lang="en-US"/>
           </a:p>
@@ -5141,7 +5141,7 @@
           <a:p>
             <a:fld id="{EB74E135-061F-4684-BC58-EA3602960468}" type="datetimeFigureOut">
               <a:rPr lang="en-US" smtClean="0"/>
-              <a:t>1/3/2022</a:t>
+              <a:t>1/4/2022</a:t>
             </a:fld>
             <a:endParaRPr lang="en-US"/>
           </a:p>
@@ -5452,7 +5452,7 @@
           <a:p>
             <a:fld id="{EB74E135-061F-4684-BC58-EA3602960468}" type="datetimeFigureOut">
               <a:rPr lang="en-US" smtClean="0"/>
-              <a:t>1/3/2022</a:t>
+              <a:t>1/4/2022</a:t>
             </a:fld>
             <a:endParaRPr lang="en-US"/>
           </a:p>
@@ -5740,7 +5740,7 @@
           <a:p>
             <a:fld id="{EB74E135-061F-4684-BC58-EA3602960468}" type="datetimeFigureOut">
               <a:rPr lang="en-US" smtClean="0"/>
-              <a:t>1/3/2022</a:t>
+              <a:t>1/4/2022</a:t>
             </a:fld>
             <a:endParaRPr lang="en-US"/>
           </a:p>
@@ -5981,7 +5981,7 @@
           <a:p>
             <a:fld id="{EB74E135-061F-4684-BC58-EA3602960468}" type="datetimeFigureOut">
               <a:rPr lang="en-US" smtClean="0"/>
-              <a:t>1/3/2022</a:t>
+              <a:t>1/4/2022</a:t>
             </a:fld>
             <a:endParaRPr lang="en-US"/>
           </a:p>
@@ -7156,10 +7156,10 @@
       </p:sp>
       <p:pic>
         <p:nvPicPr>
-          <p:cNvPr id="5" name="Content Placeholder 4" descr="Diagram&#10;&#10;Description automatically generated">
+          <p:cNvPr id="7" name="Content Placeholder 6" descr="Diagram&#10;&#10;Description automatically generated">
             <a:extLst>
               <a:ext uri="{FF2B5EF4-FFF2-40B4-BE49-F238E27FC236}">
-                <a16:creationId xmlns:a16="http://schemas.microsoft.com/office/drawing/2014/main" id="{510F329A-9793-4A2A-915C-D98A8901F526}"/>
+                <a16:creationId xmlns:a16="http://schemas.microsoft.com/office/drawing/2014/main" id="{6E3CC42B-F1F2-4E0D-815C-5EDF80C18BFB}"/>
               </a:ext>
             </a:extLst>
           </p:cNvPr>
@@ -7184,8 +7184,8 @@
         </p:blipFill>
         <p:spPr>
           <a:xfrm>
-            <a:off x="3071037" y="900332"/>
-            <a:ext cx="7336415" cy="5276631"/>
+            <a:off x="2400705" y="436098"/>
+            <a:ext cx="9750649" cy="5740865"/>
           </a:xfrm>
         </p:spPr>
       </p:pic>
@@ -7336,10 +7336,10 @@
       </p:sp>
       <p:pic>
         <p:nvPicPr>
-          <p:cNvPr id="5" name="Content Placeholder 4" descr="Diagram&#10;&#10;Description automatically generated">
+          <p:cNvPr id="7" name="Content Placeholder 6" descr="Diagram&#10;&#10;Description automatically generated">
             <a:extLst>
               <a:ext uri="{FF2B5EF4-FFF2-40B4-BE49-F238E27FC236}">
-                <a16:creationId xmlns:a16="http://schemas.microsoft.com/office/drawing/2014/main" id="{3872C481-80BB-49F0-8F48-8B70091A3231}"/>
+                <a16:creationId xmlns:a16="http://schemas.microsoft.com/office/drawing/2014/main" id="{602EDEFC-5368-48B8-9828-AD89B4EEA43E}"/>
               </a:ext>
             </a:extLst>
           </p:cNvPr>
@@ -7364,8 +7364,8 @@
         </p:blipFill>
         <p:spPr>
           <a:xfrm>
-            <a:off x="2644466" y="1252024"/>
-            <a:ext cx="6377310" cy="4826465"/>
+            <a:off x="3221242" y="1825625"/>
+            <a:ext cx="5749515" cy="4351338"/>
           </a:xfrm>
         </p:spPr>
       </p:pic>
@@ -7429,10 +7429,10 @@
       </p:sp>
       <p:pic>
         <p:nvPicPr>
-          <p:cNvPr id="5" name="Content Placeholder 4" descr="Diagram&#10;&#10;Description automatically generated">
+          <p:cNvPr id="7" name="Content Placeholder 6" descr="Diagram&#10;&#10;Description automatically generated">
             <a:extLst>
               <a:ext uri="{FF2B5EF4-FFF2-40B4-BE49-F238E27FC236}">
-                <a16:creationId xmlns:a16="http://schemas.microsoft.com/office/drawing/2014/main" id="{10B16032-0786-4929-8FB4-8E0538739A43}"/>
+                <a16:creationId xmlns:a16="http://schemas.microsoft.com/office/drawing/2014/main" id="{381C8E39-F820-4CD4-97CA-61C94762344F}"/>
               </a:ext>
             </a:extLst>
           </p:cNvPr>
@@ -7457,8 +7457,8 @@
         </p:blipFill>
         <p:spPr>
           <a:xfrm>
-            <a:off x="1377552" y="1825625"/>
-            <a:ext cx="9436896" cy="4351338"/>
+            <a:off x="1356235" y="1825625"/>
+            <a:ext cx="9479530" cy="4351338"/>
           </a:xfrm>
         </p:spPr>
       </p:pic>
@@ -7522,10 +7522,10 @@
       </p:sp>
       <p:pic>
         <p:nvPicPr>
-          <p:cNvPr id="5" name="Content Placeholder 4" descr="Diagram&#10;&#10;Description automatically generated">
+          <p:cNvPr id="7" name="Content Placeholder 6" descr="Diagram&#10;&#10;Description automatically generated">
             <a:extLst>
               <a:ext uri="{FF2B5EF4-FFF2-40B4-BE49-F238E27FC236}">
-                <a16:creationId xmlns:a16="http://schemas.microsoft.com/office/drawing/2014/main" id="{86E2F87F-D469-46A2-B7E9-424DEC43206A}"/>
+                <a16:creationId xmlns:a16="http://schemas.microsoft.com/office/drawing/2014/main" id="{D5E69A5A-7BFF-48D6-B982-86A3F98662E6}"/>
               </a:ext>
             </a:extLst>
           </p:cNvPr>
@@ -7550,8 +7550,8 @@
         </p:blipFill>
         <p:spPr>
           <a:xfrm>
-            <a:off x="2788880" y="1825625"/>
-            <a:ext cx="6614239" cy="4351338"/>
+            <a:off x="3094902" y="1211584"/>
+            <a:ext cx="6849198" cy="4965379"/>
           </a:xfrm>
         </p:spPr>
       </p:pic>
@@ -7615,10 +7615,10 @@
       </p:sp>
       <p:pic>
         <p:nvPicPr>
-          <p:cNvPr id="5" name="Content Placeholder 4" descr="Diagram&#10;&#10;Description automatically generated">
+          <p:cNvPr id="7" name="Content Placeholder 6" descr="Diagram&#10;&#10;Description automatically generated">
             <a:extLst>
               <a:ext uri="{FF2B5EF4-FFF2-40B4-BE49-F238E27FC236}">
-                <a16:creationId xmlns:a16="http://schemas.microsoft.com/office/drawing/2014/main" id="{0DEDEAFB-9966-46D8-8D27-80195BAB466B}"/>
+                <a16:creationId xmlns:a16="http://schemas.microsoft.com/office/drawing/2014/main" id="{8733F3CC-C238-43F6-BB12-3071A4014811}"/>
               </a:ext>
             </a:extLst>
           </p:cNvPr>
@@ -7643,8 +7643,8 @@
         </p:blipFill>
         <p:spPr>
           <a:xfrm>
-            <a:off x="2613822" y="1384949"/>
-            <a:ext cx="7669661" cy="4792014"/>
+            <a:off x="3198193" y="1257300"/>
+            <a:ext cx="8155607" cy="4862513"/>
           </a:xfrm>
         </p:spPr>
       </p:pic>

</xml_diff>